<commit_message>
Started report and added some stats to excel
</commit_message>
<xml_diff>
--- a/Delivery 3/IPC.pptx
+++ b/Delivery 3/IPC.pptx
@@ -197,7 +197,7 @@
               <a:cs typeface="+mn-cs"/>
             </a:defRPr>
           </a:pPr>
-          <a:endParaRPr lang="pt-PT"/>
+          <a:endParaRPr lang="en-US"/>
         </a:p>
       </c:txPr>
     </c:title>
@@ -413,7 +413,7 @@
                 <a:cs typeface="+mn-cs"/>
               </a:defRPr>
             </a:pPr>
-            <a:endParaRPr lang="pt-PT"/>
+            <a:endParaRPr lang="en-US"/>
           </a:p>
         </c:txPr>
         <c:crossAx val="722777824"/>
@@ -472,7 +472,7 @@
                 <a:cs typeface="+mn-cs"/>
               </a:defRPr>
             </a:pPr>
-            <a:endParaRPr lang="pt-PT"/>
+            <a:endParaRPr lang="en-US"/>
           </a:p>
         </c:txPr>
         <c:crossAx val="722777408"/>
@@ -514,7 +514,7 @@
               <a:cs typeface="+mn-cs"/>
             </a:defRPr>
           </a:pPr>
-          <a:endParaRPr lang="pt-PT"/>
+          <a:endParaRPr lang="en-US"/>
         </a:p>
       </c:txPr>
     </c:legend>
@@ -543,7 +543,7 @@
       <a:pPr>
         <a:defRPr/>
       </a:pPr>
-      <a:endParaRPr lang="pt-PT"/>
+      <a:endParaRPr lang="en-US"/>
     </a:p>
   </c:txPr>
   <c:externalData r:id="rId3">
@@ -1177,7 +1177,7 @@
           <a:p>
             <a:fld id="{4F6590E9-5A00-4A04-B416-3F52BBF3A723}" type="datetimeFigureOut">
               <a:rPr lang="en-GB" smtClean="0"/>
-              <a:t>13/12/2022</a:t>
+              <a:t>14/12/2022</a:t>
             </a:fld>
             <a:endParaRPr lang="en-GB"/>
           </a:p>
@@ -1676,7 +1676,7 @@
           <a:p>
             <a:fld id="{6422C9F5-CE6F-4BEE-84C2-81E4985345AA}" type="datetimeFigureOut">
               <a:rPr lang="en-US" smtClean="0"/>
-              <a:t>12/13/2022</a:t>
+              <a:t>12/14/2022</a:t>
             </a:fld>
             <a:endParaRPr lang="en-US"/>
           </a:p>
@@ -1874,7 +1874,7 @@
           <a:p>
             <a:fld id="{6422C9F5-CE6F-4BEE-84C2-81E4985345AA}" type="datetimeFigureOut">
               <a:rPr lang="en-US" smtClean="0"/>
-              <a:t>12/13/2022</a:t>
+              <a:t>12/14/2022</a:t>
             </a:fld>
             <a:endParaRPr lang="en-US"/>
           </a:p>
@@ -2082,7 +2082,7 @@
           <a:p>
             <a:fld id="{6422C9F5-CE6F-4BEE-84C2-81E4985345AA}" type="datetimeFigureOut">
               <a:rPr lang="en-US" smtClean="0"/>
-              <a:t>12/13/2022</a:t>
+              <a:t>12/14/2022</a:t>
             </a:fld>
             <a:endParaRPr lang="en-US"/>
           </a:p>
@@ -2280,7 +2280,7 @@
           <a:p>
             <a:fld id="{6422C9F5-CE6F-4BEE-84C2-81E4985345AA}" type="datetimeFigureOut">
               <a:rPr lang="en-US" smtClean="0"/>
-              <a:t>12/13/2022</a:t>
+              <a:t>12/14/2022</a:t>
             </a:fld>
             <a:endParaRPr lang="en-US"/>
           </a:p>
@@ -2555,7 +2555,7 @@
           <a:p>
             <a:fld id="{6422C9F5-CE6F-4BEE-84C2-81E4985345AA}" type="datetimeFigureOut">
               <a:rPr lang="en-US" smtClean="0"/>
-              <a:t>12/13/2022</a:t>
+              <a:t>12/14/2022</a:t>
             </a:fld>
             <a:endParaRPr lang="en-US"/>
           </a:p>
@@ -2820,7 +2820,7 @@
           <a:p>
             <a:fld id="{6422C9F5-CE6F-4BEE-84C2-81E4985345AA}" type="datetimeFigureOut">
               <a:rPr lang="en-US" smtClean="0"/>
-              <a:t>12/13/2022</a:t>
+              <a:t>12/14/2022</a:t>
             </a:fld>
             <a:endParaRPr lang="en-US"/>
           </a:p>
@@ -3232,7 +3232,7 @@
           <a:p>
             <a:fld id="{6422C9F5-CE6F-4BEE-84C2-81E4985345AA}" type="datetimeFigureOut">
               <a:rPr lang="en-US" smtClean="0"/>
-              <a:t>12/13/2022</a:t>
+              <a:t>12/14/2022</a:t>
             </a:fld>
             <a:endParaRPr lang="en-US"/>
           </a:p>
@@ -3373,7 +3373,7 @@
           <a:p>
             <a:fld id="{6422C9F5-CE6F-4BEE-84C2-81E4985345AA}" type="datetimeFigureOut">
               <a:rPr lang="en-US" smtClean="0"/>
-              <a:t>12/13/2022</a:t>
+              <a:t>12/14/2022</a:t>
             </a:fld>
             <a:endParaRPr lang="en-US"/>
           </a:p>
@@ -3486,7 +3486,7 @@
           <a:p>
             <a:fld id="{6422C9F5-CE6F-4BEE-84C2-81E4985345AA}" type="datetimeFigureOut">
               <a:rPr lang="en-US" smtClean="0"/>
-              <a:t>12/13/2022</a:t>
+              <a:t>12/14/2022</a:t>
             </a:fld>
             <a:endParaRPr lang="en-US"/>
           </a:p>
@@ -3797,7 +3797,7 @@
           <a:p>
             <a:fld id="{6422C9F5-CE6F-4BEE-84C2-81E4985345AA}" type="datetimeFigureOut">
               <a:rPr lang="en-US" smtClean="0"/>
-              <a:t>12/13/2022</a:t>
+              <a:t>12/14/2022</a:t>
             </a:fld>
             <a:endParaRPr lang="en-US"/>
           </a:p>
@@ -4085,7 +4085,7 @@
           <a:p>
             <a:fld id="{6422C9F5-CE6F-4BEE-84C2-81E4985345AA}" type="datetimeFigureOut">
               <a:rPr lang="en-US" smtClean="0"/>
-              <a:t>12/13/2022</a:t>
+              <a:t>12/14/2022</a:t>
             </a:fld>
             <a:endParaRPr lang="en-US"/>
           </a:p>
@@ -4326,7 +4326,7 @@
           <a:p>
             <a:fld id="{6422C9F5-CE6F-4BEE-84C2-81E4985345AA}" type="datetimeFigureOut">
               <a:rPr lang="en-US" smtClean="0"/>
-              <a:t>12/13/2022</a:t>
+              <a:t>12/14/2022</a:t>
             </a:fld>
             <a:endParaRPr lang="en-US"/>
           </a:p>
@@ -19634,13 +19634,294 @@
           </a:lstStyle>
           <a:p>
             <a:r>
-              <a:rPr lang="en-US" b="1" dirty="0" err="1"/>
-              <a:t>Sumative</a:t>
+              <a:rPr lang="en-US" b="1" dirty="0"/>
+              <a:t>User Evaluation Summary</a:t>
+            </a:r>
+          </a:p>
+        </p:txBody>
+      </p:sp>
+      <p:sp>
+        <p:nvSpPr>
+          <p:cNvPr id="7" name="Content Placeholder 2">
+            <a:extLst>
+              <a:ext uri="{FF2B5EF4-FFF2-40B4-BE49-F238E27FC236}">
+                <a16:creationId xmlns:a16="http://schemas.microsoft.com/office/drawing/2014/main" id="{1656EF8D-7FD8-D790-0595-F12942DAEB06}"/>
+              </a:ext>
+            </a:extLst>
+          </p:cNvPr>
+          <p:cNvSpPr txBox="1">
+            <a:spLocks/>
+          </p:cNvSpPr>
+          <p:nvPr/>
+        </p:nvSpPr>
+        <p:spPr>
+          <a:xfrm>
+            <a:off x="704851" y="1810752"/>
+            <a:ext cx="5159005" cy="4111583"/>
+          </a:xfrm>
+          <a:prstGeom prst="rect">
+            <a:avLst/>
+          </a:prstGeom>
+        </p:spPr>
+        <p:txBody>
+          <a:bodyPr vert="horz" lIns="91440" tIns="45720" rIns="91440" bIns="45720" rtlCol="0">
+            <a:normAutofit/>
+          </a:bodyPr>
+          <a:lstStyle>
+            <a:lvl1pPr marL="228600" indent="-228600" algn="l" defTabSz="914400" rtl="0" eaLnBrk="1" latinLnBrk="0" hangingPunct="1">
+              <a:lnSpc>
+                <a:spcPct val="90000"/>
+              </a:lnSpc>
+              <a:spcBef>
+                <a:spcPts val="1000"/>
+              </a:spcBef>
+              <a:buFont typeface="Arial" panose="020B0604020202020204" pitchFamily="34" charset="0"/>
+              <a:buChar char="•"/>
+              <a:defRPr sz="2800" kern="1200">
+                <a:solidFill>
+                  <a:schemeClr val="tx1"/>
+                </a:solidFill>
+                <a:latin typeface="+mn-lt"/>
+                <a:ea typeface="+mn-ea"/>
+                <a:cs typeface="+mn-cs"/>
+              </a:defRPr>
+            </a:lvl1pPr>
+            <a:lvl2pPr marL="685800" indent="-228600" algn="l" defTabSz="914400" rtl="0" eaLnBrk="1" latinLnBrk="0" hangingPunct="1">
+              <a:lnSpc>
+                <a:spcPct val="90000"/>
+              </a:lnSpc>
+              <a:spcBef>
+                <a:spcPts val="500"/>
+              </a:spcBef>
+              <a:buFont typeface="Arial" panose="020B0604020202020204" pitchFamily="34" charset="0"/>
+              <a:buChar char="•"/>
+              <a:defRPr sz="2400" kern="1200">
+                <a:solidFill>
+                  <a:schemeClr val="tx1"/>
+                </a:solidFill>
+                <a:latin typeface="+mn-lt"/>
+                <a:ea typeface="+mn-ea"/>
+                <a:cs typeface="+mn-cs"/>
+              </a:defRPr>
+            </a:lvl2pPr>
+            <a:lvl3pPr marL="1143000" indent="-228600" algn="l" defTabSz="914400" rtl="0" eaLnBrk="1" latinLnBrk="0" hangingPunct="1">
+              <a:lnSpc>
+                <a:spcPct val="90000"/>
+              </a:lnSpc>
+              <a:spcBef>
+                <a:spcPts val="500"/>
+              </a:spcBef>
+              <a:buFont typeface="Arial" panose="020B0604020202020204" pitchFamily="34" charset="0"/>
+              <a:buChar char="•"/>
+              <a:defRPr sz="2000" kern="1200">
+                <a:solidFill>
+                  <a:schemeClr val="tx1"/>
+                </a:solidFill>
+                <a:latin typeface="+mn-lt"/>
+                <a:ea typeface="+mn-ea"/>
+                <a:cs typeface="+mn-cs"/>
+              </a:defRPr>
+            </a:lvl3pPr>
+            <a:lvl4pPr marL="1600200" indent="-228600" algn="l" defTabSz="914400" rtl="0" eaLnBrk="1" latinLnBrk="0" hangingPunct="1">
+              <a:lnSpc>
+                <a:spcPct val="90000"/>
+              </a:lnSpc>
+              <a:spcBef>
+                <a:spcPts val="500"/>
+              </a:spcBef>
+              <a:buFont typeface="Arial" panose="020B0604020202020204" pitchFamily="34" charset="0"/>
+              <a:buChar char="•"/>
+              <a:defRPr sz="1800" kern="1200">
+                <a:solidFill>
+                  <a:schemeClr val="tx1"/>
+                </a:solidFill>
+                <a:latin typeface="+mn-lt"/>
+                <a:ea typeface="+mn-ea"/>
+                <a:cs typeface="+mn-cs"/>
+              </a:defRPr>
+            </a:lvl4pPr>
+            <a:lvl5pPr marL="2057400" indent="-228600" algn="l" defTabSz="914400" rtl="0" eaLnBrk="1" latinLnBrk="0" hangingPunct="1">
+              <a:lnSpc>
+                <a:spcPct val="90000"/>
+              </a:lnSpc>
+              <a:spcBef>
+                <a:spcPts val="500"/>
+              </a:spcBef>
+              <a:buFont typeface="Arial" panose="020B0604020202020204" pitchFamily="34" charset="0"/>
+              <a:buChar char="•"/>
+              <a:defRPr sz="1800" kern="1200">
+                <a:solidFill>
+                  <a:schemeClr val="tx1"/>
+                </a:solidFill>
+                <a:latin typeface="+mn-lt"/>
+                <a:ea typeface="+mn-ea"/>
+                <a:cs typeface="+mn-cs"/>
+              </a:defRPr>
+            </a:lvl5pPr>
+            <a:lvl6pPr marL="2514600" indent="-228600" algn="l" defTabSz="914400" rtl="0" eaLnBrk="1" latinLnBrk="0" hangingPunct="1">
+              <a:lnSpc>
+                <a:spcPct val="90000"/>
+              </a:lnSpc>
+              <a:spcBef>
+                <a:spcPts val="500"/>
+              </a:spcBef>
+              <a:buFont typeface="Arial" panose="020B0604020202020204" pitchFamily="34" charset="0"/>
+              <a:buChar char="•"/>
+              <a:defRPr sz="1800" kern="1200">
+                <a:solidFill>
+                  <a:schemeClr val="tx1"/>
+                </a:solidFill>
+                <a:latin typeface="+mn-lt"/>
+                <a:ea typeface="+mn-ea"/>
+                <a:cs typeface="+mn-cs"/>
+              </a:defRPr>
+            </a:lvl6pPr>
+            <a:lvl7pPr marL="2971800" indent="-228600" algn="l" defTabSz="914400" rtl="0" eaLnBrk="1" latinLnBrk="0" hangingPunct="1">
+              <a:lnSpc>
+                <a:spcPct val="90000"/>
+              </a:lnSpc>
+              <a:spcBef>
+                <a:spcPts val="500"/>
+              </a:spcBef>
+              <a:buFont typeface="Arial" panose="020B0604020202020204" pitchFamily="34" charset="0"/>
+              <a:buChar char="•"/>
+              <a:defRPr sz="1800" kern="1200">
+                <a:solidFill>
+                  <a:schemeClr val="tx1"/>
+                </a:solidFill>
+                <a:latin typeface="+mn-lt"/>
+                <a:ea typeface="+mn-ea"/>
+                <a:cs typeface="+mn-cs"/>
+              </a:defRPr>
+            </a:lvl7pPr>
+            <a:lvl8pPr marL="3429000" indent="-228600" algn="l" defTabSz="914400" rtl="0" eaLnBrk="1" latinLnBrk="0" hangingPunct="1">
+              <a:lnSpc>
+                <a:spcPct val="90000"/>
+              </a:lnSpc>
+              <a:spcBef>
+                <a:spcPts val="500"/>
+              </a:spcBef>
+              <a:buFont typeface="Arial" panose="020B0604020202020204" pitchFamily="34" charset="0"/>
+              <a:buChar char="•"/>
+              <a:defRPr sz="1800" kern="1200">
+                <a:solidFill>
+                  <a:schemeClr val="tx1"/>
+                </a:solidFill>
+                <a:latin typeface="+mn-lt"/>
+                <a:ea typeface="+mn-ea"/>
+                <a:cs typeface="+mn-cs"/>
+              </a:defRPr>
+            </a:lvl8pPr>
+            <a:lvl9pPr marL="3886200" indent="-228600" algn="l" defTabSz="914400" rtl="0" eaLnBrk="1" latinLnBrk="0" hangingPunct="1">
+              <a:lnSpc>
+                <a:spcPct val="90000"/>
+              </a:lnSpc>
+              <a:spcBef>
+                <a:spcPts val="500"/>
+              </a:spcBef>
+              <a:buFont typeface="Arial" panose="020B0604020202020204" pitchFamily="34" charset="0"/>
+              <a:buChar char="•"/>
+              <a:defRPr sz="1800" kern="1200">
+                <a:solidFill>
+                  <a:schemeClr val="tx1"/>
+                </a:solidFill>
+                <a:latin typeface="+mn-lt"/>
+                <a:ea typeface="+mn-ea"/>
+                <a:cs typeface="+mn-cs"/>
+              </a:defRPr>
+            </a:lvl9pPr>
+          </a:lstStyle>
+          <a:p>
+            <a:pPr marL="0" indent="0">
+              <a:buFont typeface="Arial" panose="020B0604020202020204" pitchFamily="34" charset="0"/>
+              <a:buNone/>
+            </a:pPr>
+            <a:r>
+              <a:rPr lang="en-US" sz="2000" b="1" dirty="0"/>
+              <a:t>13 responses</a:t>
             </a:r>
             <a:r>
-              <a:rPr lang="en-US" b="1" dirty="0"/>
-              <a:t> Evaluation</a:t>
+              <a:rPr lang="en-US" sz="2000" dirty="0"/>
+              <a:t> mostly friends from other colleges</a:t>
             </a:r>
+          </a:p>
+          <a:p>
+            <a:pPr marL="0" indent="0">
+              <a:buFont typeface="Arial" panose="020B0604020202020204" pitchFamily="34" charset="0"/>
+              <a:buNone/>
+            </a:pPr>
+            <a:r>
+              <a:rPr lang="en-US" sz="2000" b="1" dirty="0"/>
+              <a:t>Gender</a:t>
+            </a:r>
+          </a:p>
+          <a:p>
+            <a:pPr marL="0" indent="0">
+              <a:buFont typeface="Arial" panose="020B0604020202020204" pitchFamily="34" charset="0"/>
+              <a:buNone/>
+            </a:pPr>
+            <a:r>
+              <a:rPr lang="en-US" sz="2000" b="1" dirty="0"/>
+              <a:t>58% male </a:t>
+            </a:r>
+            <a:r>
+              <a:rPr lang="en-US" sz="2000" dirty="0"/>
+              <a:t>a bad thing</a:t>
+            </a:r>
+          </a:p>
+          <a:p>
+            <a:pPr marL="0" indent="0">
+              <a:buFont typeface="Arial" panose="020B0604020202020204" pitchFamily="34" charset="0"/>
+              <a:buNone/>
+            </a:pPr>
+            <a:r>
+              <a:rPr lang="en-US" sz="2000" b="1" dirty="0"/>
+              <a:t>Age </a:t>
+            </a:r>
+          </a:p>
+          <a:p>
+            <a:pPr marL="0" indent="0">
+              <a:buFont typeface="Arial" panose="020B0604020202020204" pitchFamily="34" charset="0"/>
+              <a:buNone/>
+            </a:pPr>
+            <a:r>
+              <a:rPr lang="en-US" sz="2000" b="1" dirty="0"/>
+              <a:t>Average </a:t>
+            </a:r>
+            <a:r>
+              <a:rPr lang="en-US" sz="2000" dirty="0"/>
+              <a:t>26</a:t>
+            </a:r>
+            <a:endParaRPr lang="en-US" sz="2000" b="1" dirty="0"/>
+          </a:p>
+          <a:p>
+            <a:pPr marL="0" indent="0">
+              <a:buFont typeface="Arial" panose="020B0604020202020204" pitchFamily="34" charset="0"/>
+              <a:buNone/>
+            </a:pPr>
+            <a:r>
+              <a:rPr lang="en-US" sz="2000" b="1" dirty="0"/>
+              <a:t>Median </a:t>
+            </a:r>
+            <a:r>
+              <a:rPr lang="en-US" sz="2000" dirty="0"/>
+              <a:t>20</a:t>
+            </a:r>
+          </a:p>
+          <a:p>
+            <a:pPr marL="0" indent="0">
+              <a:buFont typeface="Arial" panose="020B0604020202020204" pitchFamily="34" charset="0"/>
+              <a:buNone/>
+            </a:pPr>
+            <a:r>
+              <a:rPr lang="en-US" sz="2000" b="1" dirty="0"/>
+              <a:t>Under 25 </a:t>
+            </a:r>
+            <a:r>
+              <a:rPr lang="en-US" sz="2000" dirty="0"/>
+              <a:t>78%</a:t>
+            </a:r>
+            <a:endParaRPr lang="en-US" sz="2000" b="1" dirty="0"/>
           </a:p>
         </p:txBody>
       </p:sp>
@@ -20248,15 +20529,6 @@
 </file>
 
 <file path=customXml/item1.xml><?xml version="1.0" encoding="utf-8"?>
-<?mso-contentType ?>
-<FormTemplates xmlns="http://schemas.microsoft.com/sharepoint/v3/contenttype/forms">
-  <Display>DocumentLibraryForm</Display>
-  <Edit>DocumentLibraryForm</Edit>
-  <New>DocumentLibraryForm</New>
-</FormTemplates>
-</file>
-
-<file path=customXml/item2.xml><?xml version="1.0" encoding="utf-8"?>
 <ct:contentTypeSchema xmlns:ct="http://schemas.microsoft.com/office/2006/metadata/contentType" xmlns:ma="http://schemas.microsoft.com/office/2006/metadata/properties/metaAttributes" ct:_="" ma:_="" ma:contentTypeName="Documento" ma:contentTypeID="0x01010014BC32AFF3718747B5A2CE47A88F3C6A" ma:contentTypeVersion="2" ma:contentTypeDescription="Criar um novo documento." ma:contentTypeScope="" ma:versionID="fee3d826901bcb9451dce0bbc19dadc3">
   <xsd:schema xmlns:xsd="http://www.w3.org/2001/XMLSchema" xmlns:xs="http://www.w3.org/2001/XMLSchema" xmlns:p="http://schemas.microsoft.com/office/2006/metadata/properties" xmlns:ns3="a47fcd35-67e3-4b66-9352-8d0db098ec50" targetNamespace="http://schemas.microsoft.com/office/2006/metadata/properties" ma:root="true" ma:fieldsID="deb6b73c7f47f6e6612a6af669b62c39" ns3:_="">
     <xsd:import namespace="a47fcd35-67e3-4b66-9352-8d0db098ec50"/>
@@ -20388,6 +20660,15 @@
 </ct:contentTypeSchema>
 </file>
 
+<file path=customXml/item2.xml><?xml version="1.0" encoding="utf-8"?>
+<?mso-contentType ?>
+<FormTemplates xmlns="http://schemas.microsoft.com/sharepoint/v3/contenttype/forms">
+  <Display>DocumentLibraryForm</Display>
+  <Edit>DocumentLibraryForm</Edit>
+  <New>DocumentLibraryForm</New>
+</FormTemplates>
+</file>
+
 <file path=customXml/item3.xml><?xml version="1.0" encoding="utf-8"?>
 <p:properties xmlns:p="http://schemas.microsoft.com/office/2006/metadata/properties" xmlns:xsi="http://www.w3.org/2001/XMLSchema-instance" xmlns:pc="http://schemas.microsoft.com/office/infopath/2007/PartnerControls">
   <documentManagement/>
@@ -20395,14 +20676,6 @@
 </file>
 
 <file path=customXml/itemProps1.xml><?xml version="1.0" encoding="utf-8"?>
-<ds:datastoreItem xmlns:ds="http://schemas.openxmlformats.org/officeDocument/2006/customXml" ds:itemID="{76EE102A-C587-47D4-980D-6EF803504572}">
-  <ds:schemaRefs>
-    <ds:schemaRef ds:uri="http://schemas.microsoft.com/sharepoint/v3/contenttype/forms"/>
-  </ds:schemaRefs>
-</ds:datastoreItem>
-</file>
-
-<file path=customXml/itemProps2.xml><?xml version="1.0" encoding="utf-8"?>
 <ds:datastoreItem xmlns:ds="http://schemas.openxmlformats.org/officeDocument/2006/customXml" ds:itemID="{9697E427-2E56-4B40-B661-233DAE44C32F}">
   <ds:schemaRefs>
     <ds:schemaRef ds:uri="http://schemas.microsoft.com/office/2006/metadata/contentType"/>
@@ -20416,6 +20689,14 @@
     <ds:schemaRef ds:uri="http://purl.org/dc/elements/1.1/"/>
     <ds:schemaRef ds:uri="http://purl.org/dc/terms/"/>
     <ds:schemaRef ds:uri="http://schemas.microsoft.com/internal/obd"/>
+  </ds:schemaRefs>
+</ds:datastoreItem>
+</file>
+
+<file path=customXml/itemProps2.xml><?xml version="1.0" encoding="utf-8"?>
+<ds:datastoreItem xmlns:ds="http://schemas.openxmlformats.org/officeDocument/2006/customXml" ds:itemID="{76EE102A-C587-47D4-980D-6EF803504572}">
+  <ds:schemaRefs>
+    <ds:schemaRef ds:uri="http://schemas.microsoft.com/sharepoint/v3/contenttype/forms"/>
   </ds:schemaRefs>
 </ds:datastoreItem>
 </file>

</xml_diff>